<commit_message>
added chunking, pos and ner tagging slides
</commit_message>
<xml_diff>
--- a/info/Preprocessing.pptx
+++ b/info/Preprocessing.pptx
@@ -7,7 +7,7 @@
     <p:sldMasterId id="2147483700" r:id="rId3"/>
   </p:sldMasterIdLst>
   <p:notesMasterIdLst>
-    <p:notesMasterId r:id="rId12"/>
+    <p:notesMasterId r:id="rId15"/>
   </p:notesMasterIdLst>
   <p:sldIdLst>
     <p:sldId id="294" r:id="rId4"/>
@@ -17,7 +17,10 @@
     <p:sldId id="300" r:id="rId8"/>
     <p:sldId id="301" r:id="rId9"/>
     <p:sldId id="302" r:id="rId10"/>
-    <p:sldId id="283" r:id="rId11"/>
+    <p:sldId id="303" r:id="rId11"/>
+    <p:sldId id="304" r:id="rId12"/>
+    <p:sldId id="305" r:id="rId13"/>
+    <p:sldId id="283" r:id="rId14"/>
   </p:sldIdLst>
   <p:sldSz cx="10080625" cy="7559675"/>
   <p:notesSz cx="7559675" cy="10691813"/>
@@ -218,7 +221,7 @@
             <a:fld id="{AFCBF5DE-90D3-446D-BD2C-9DED6B868ADE}" type="datetimeFigureOut">
               <a:rPr lang="en-US" smtClean="0"/>
               <a:pPr/>
-              <a:t>6/30/2020</a:t>
+              <a:t>7/1/2020</a:t>
             </a:fld>
             <a:endParaRPr lang="en-US"/>
           </a:p>
@@ -2816,7 +2819,7 @@
             <a:fld id="{5D6495F3-B757-4FAF-98AA-EDA7D1485485}" type="datetimeFigureOut">
               <a:rPr lang="en-US" smtClean="0"/>
               <a:pPr/>
-              <a:t>6/30/2020</a:t>
+              <a:t>7/1/2020</a:t>
             </a:fld>
             <a:endParaRPr lang="en-US"/>
           </a:p>
@@ -3016,7 +3019,7 @@
             <a:fld id="{5D6495F3-B757-4FAF-98AA-EDA7D1485485}" type="datetimeFigureOut">
               <a:rPr lang="en-US" smtClean="0"/>
               <a:pPr/>
-              <a:t>6/30/2020</a:t>
+              <a:t>7/1/2020</a:t>
             </a:fld>
             <a:endParaRPr lang="en-US"/>
           </a:p>
@@ -3293,7 +3296,7 @@
             <a:fld id="{5D6495F3-B757-4FAF-98AA-EDA7D1485485}" type="datetimeFigureOut">
               <a:rPr lang="en-US" smtClean="0"/>
               <a:pPr/>
-              <a:t>6/30/2020</a:t>
+              <a:t>7/1/2020</a:t>
             </a:fld>
             <a:endParaRPr lang="en-US"/>
           </a:p>
@@ -3560,7 +3563,7 @@
             <a:fld id="{5D6495F3-B757-4FAF-98AA-EDA7D1485485}" type="datetimeFigureOut">
               <a:rPr lang="en-US" smtClean="0"/>
               <a:pPr/>
-              <a:t>6/30/2020</a:t>
+              <a:t>7/1/2020</a:t>
             </a:fld>
             <a:endParaRPr lang="en-US"/>
           </a:p>
@@ -3974,7 +3977,7 @@
             <a:fld id="{5D6495F3-B757-4FAF-98AA-EDA7D1485485}" type="datetimeFigureOut">
               <a:rPr lang="en-US" smtClean="0"/>
               <a:pPr/>
-              <a:t>6/30/2020</a:t>
+              <a:t>7/1/2020</a:t>
             </a:fld>
             <a:endParaRPr lang="en-US"/>
           </a:p>
@@ -4216,7 +4219,7 @@
             <a:fld id="{5D6495F3-B757-4FAF-98AA-EDA7D1485485}" type="datetimeFigureOut">
               <a:rPr lang="en-US" smtClean="0"/>
               <a:pPr/>
-              <a:t>6/30/2020</a:t>
+              <a:t>7/1/2020</a:t>
             </a:fld>
             <a:endParaRPr lang="en-US"/>
           </a:p>
@@ -4331,7 +4334,7 @@
             <a:fld id="{5D6495F3-B757-4FAF-98AA-EDA7D1485485}" type="datetimeFigureOut">
               <a:rPr lang="en-US" smtClean="0"/>
               <a:pPr/>
-              <a:t>6/30/2020</a:t>
+              <a:t>7/1/2020</a:t>
             </a:fld>
             <a:endParaRPr lang="en-US"/>
           </a:p>
@@ -4644,7 +4647,7 @@
             <a:fld id="{5D6495F3-B757-4FAF-98AA-EDA7D1485485}" type="datetimeFigureOut">
               <a:rPr lang="en-US" smtClean="0"/>
               <a:pPr/>
-              <a:t>6/30/2020</a:t>
+              <a:t>7/1/2020</a:t>
             </a:fld>
             <a:endParaRPr lang="en-US"/>
           </a:p>
@@ -4937,7 +4940,7 @@
             <a:fld id="{5D6495F3-B757-4FAF-98AA-EDA7D1485485}" type="datetimeFigureOut">
               <a:rPr lang="en-US" smtClean="0"/>
               <a:pPr/>
-              <a:t>6/30/2020</a:t>
+              <a:t>7/1/2020</a:t>
             </a:fld>
             <a:endParaRPr lang="en-US"/>
           </a:p>
@@ -5137,7 +5140,7 @@
             <a:fld id="{5D6495F3-B757-4FAF-98AA-EDA7D1485485}" type="datetimeFigureOut">
               <a:rPr lang="en-US" smtClean="0"/>
               <a:pPr/>
-              <a:t>6/30/2020</a:t>
+              <a:t>7/1/2020</a:t>
             </a:fld>
             <a:endParaRPr lang="en-US"/>
           </a:p>
@@ -5347,7 +5350,7 @@
             <a:fld id="{5D6495F3-B757-4FAF-98AA-EDA7D1485485}" type="datetimeFigureOut">
               <a:rPr lang="en-US" smtClean="0"/>
               <a:pPr/>
-              <a:t>6/30/2020</a:t>
+              <a:t>7/1/2020</a:t>
             </a:fld>
             <a:endParaRPr lang="en-US"/>
           </a:p>
@@ -7747,7 +7750,7 @@
             <a:fld id="{5D6495F3-B757-4FAF-98AA-EDA7D1485485}" type="datetimeFigureOut">
               <a:rPr lang="en-US" smtClean="0"/>
               <a:pPr/>
-              <a:t>6/30/2020</a:t>
+              <a:t>7/1/2020</a:t>
             </a:fld>
             <a:endParaRPr lang="en-US"/>
           </a:p>
@@ -8647,6 +8650,421 @@
 </p:sld>
 </file>
 
+<file path=ppt/slides/slide10.xml><?xml version="1.0" encoding="utf-8"?>
+<p:sld xmlns:a="http://schemas.openxmlformats.org/drawingml/2006/main" xmlns:r="http://schemas.openxmlformats.org/officeDocument/2006/relationships" xmlns:p="http://schemas.openxmlformats.org/presentationml/2006/main">
+  <p:cSld>
+    <p:spTree>
+      <p:nvGrpSpPr>
+        <p:cNvPr id="1" name=""/>
+        <p:cNvGrpSpPr/>
+        <p:nvPr/>
+      </p:nvGrpSpPr>
+      <p:grpSpPr>
+        <a:xfrm>
+          <a:off x="0" y="0"/>
+          <a:ext cx="0" cy="0"/>
+          <a:chOff x="0" y="0"/>
+          <a:chExt cx="0" cy="0"/>
+        </a:xfrm>
+      </p:grpSpPr>
+      <p:sp>
+        <p:nvSpPr>
+          <p:cNvPr id="2" name="Title 1">
+            <a:extLst>
+              <a:ext uri="{FF2B5EF4-FFF2-40B4-BE49-F238E27FC236}">
+                <a16:creationId xmlns:a16="http://schemas.microsoft.com/office/drawing/2014/main" id="{B10FDB6E-2B3B-4240-9DDD-9566C1D6C56D}"/>
+              </a:ext>
+            </a:extLst>
+          </p:cNvPr>
+          <p:cNvSpPr>
+            <a:spLocks noGrp="1"/>
+          </p:cNvSpPr>
+          <p:nvPr>
+            <p:ph type="title"/>
+          </p:nvPr>
+        </p:nvSpPr>
+        <p:spPr>
+          <a:xfrm>
+            <a:off x="693043" y="402483"/>
+            <a:ext cx="8694539" cy="837381"/>
+          </a:xfrm>
+        </p:spPr>
+        <p:txBody>
+          <a:bodyPr>
+            <a:normAutofit/>
+          </a:bodyPr>
+          <a:lstStyle/>
+          <a:p>
+            <a:r>
+              <a:rPr lang="en-US" sz="4400" dirty="0"/>
+              <a:t>NER Tagging</a:t>
+            </a:r>
+          </a:p>
+        </p:txBody>
+      </p:sp>
+      <p:sp>
+        <p:nvSpPr>
+          <p:cNvPr id="3" name="Content Placeholder 2">
+            <a:extLst>
+              <a:ext uri="{FF2B5EF4-FFF2-40B4-BE49-F238E27FC236}">
+                <a16:creationId xmlns:a16="http://schemas.microsoft.com/office/drawing/2014/main" id="{C120D28A-A614-417F-9732-EA1F29E45085}"/>
+              </a:ext>
+            </a:extLst>
+          </p:cNvPr>
+          <p:cNvSpPr>
+            <a:spLocks noGrp="1"/>
+          </p:cNvSpPr>
+          <p:nvPr>
+            <p:ph idx="1"/>
+          </p:nvPr>
+        </p:nvSpPr>
+        <p:spPr>
+          <a:xfrm>
+            <a:off x="693042" y="1779280"/>
+            <a:ext cx="8694539" cy="5377912"/>
+          </a:xfrm>
+        </p:spPr>
+        <p:txBody>
+          <a:bodyPr>
+            <a:noAutofit/>
+          </a:bodyPr>
+          <a:lstStyle/>
+          <a:p>
+            <a:pPr>
+              <a:lnSpc>
+                <a:spcPct val="150000"/>
+              </a:lnSpc>
+            </a:pPr>
+            <a:r>
+              <a:rPr lang="en-US" sz="2100" dirty="0"/>
+              <a:t>NER (Named Entity Recognition) Tagging seeks to</a:t>
+            </a:r>
+            <a:r>
+              <a:rPr lang="en-US" sz="2100" b="0" i="0" dirty="0">
+                <a:effectLst/>
+              </a:rPr>
+              <a:t> locate and classify </a:t>
+            </a:r>
+            <a:r>
+              <a:rPr lang="en-US" sz="2100" b="1" i="0" dirty="0">
+                <a:effectLst/>
+              </a:rPr>
+              <a:t>named entities</a:t>
+            </a:r>
+            <a:r>
+              <a:rPr lang="en-US" sz="2100" b="0" i="0" dirty="0">
+                <a:effectLst/>
+              </a:rPr>
+              <a:t> in text into a set of pre-defined categories such as person names, organizations, locations, monetary values, percentages, etc.</a:t>
+            </a:r>
+          </a:p>
+          <a:p>
+            <a:pPr>
+              <a:lnSpc>
+                <a:spcPct val="150000"/>
+              </a:lnSpc>
+            </a:pPr>
+            <a:r>
+              <a:rPr lang="en-US" sz="2100" b="0" i="0">
+                <a:effectLst/>
+              </a:rPr>
+              <a:t>Useful </a:t>
+            </a:r>
+            <a:r>
+              <a:rPr lang="en-US" sz="2100" b="0" i="0" dirty="0">
+                <a:effectLst/>
+              </a:rPr>
+              <a:t>for analyzing unstructured text.</a:t>
+            </a:r>
+          </a:p>
+          <a:p>
+            <a:pPr>
+              <a:lnSpc>
+                <a:spcPct val="150000"/>
+              </a:lnSpc>
+            </a:pPr>
+            <a:r>
+              <a:rPr lang="en-US" sz="2100" b="1" dirty="0"/>
+              <a:t>Example:</a:t>
+            </a:r>
+            <a:r>
+              <a:rPr lang="en-US" sz="2100" dirty="0"/>
+              <a:t> </a:t>
+            </a:r>
+            <a:r>
+              <a:rPr lang="en-US" sz="2100" b="1" dirty="0"/>
+              <a:t>[Jim]</a:t>
+            </a:r>
+            <a:r>
+              <a:rPr lang="en-US" sz="2100" b="1" baseline="-25000" dirty="0"/>
+              <a:t>Person</a:t>
+            </a:r>
+            <a:r>
+              <a:rPr lang="en-US" sz="2100" dirty="0"/>
+              <a:t> bought 300 shares of </a:t>
+            </a:r>
+            <a:r>
+              <a:rPr lang="en-US" sz="2100" b="1" dirty="0"/>
+              <a:t>[Acme Corp.]</a:t>
+            </a:r>
+            <a:r>
+              <a:rPr lang="en-US" sz="2100" b="1" baseline="-25000" dirty="0"/>
+              <a:t>Organization</a:t>
+            </a:r>
+            <a:r>
+              <a:rPr lang="en-US" sz="2100" dirty="0"/>
+              <a:t> in </a:t>
+            </a:r>
+            <a:r>
+              <a:rPr lang="en-US" sz="2100" b="1" dirty="0"/>
+              <a:t>[2006]</a:t>
+            </a:r>
+            <a:r>
+              <a:rPr lang="en-US" sz="2100" b="1" baseline="-25000" dirty="0"/>
+              <a:t>Time</a:t>
+            </a:r>
+            <a:r>
+              <a:rPr lang="en-US" sz="2100" dirty="0"/>
+              <a:t>.</a:t>
+            </a:r>
+          </a:p>
+        </p:txBody>
+      </p:sp>
+    </p:spTree>
+    <p:extLst>
+      <p:ext uri="{BB962C8B-B14F-4D97-AF65-F5344CB8AC3E}">
+        <p14:creationId xmlns:p14="http://schemas.microsoft.com/office/powerpoint/2010/main" val="2130124585"/>
+      </p:ext>
+    </p:extLst>
+  </p:cSld>
+  <p:clrMapOvr>
+    <a:masterClrMapping/>
+  </p:clrMapOvr>
+</p:sld>
+</file>
+
+<file path=ppt/slides/slide11.xml><?xml version="1.0" encoding="utf-8"?>
+<p:sld xmlns:a="http://schemas.openxmlformats.org/drawingml/2006/main" xmlns:r="http://schemas.openxmlformats.org/officeDocument/2006/relationships" xmlns:p="http://schemas.openxmlformats.org/presentationml/2006/main">
+  <p:cSld>
+    <p:bg>
+      <p:bgPr>
+        <a:solidFill>
+          <a:schemeClr val="bg1"/>
+        </a:solidFill>
+        <a:effectLst/>
+      </p:bgPr>
+    </p:bg>
+    <p:spTree>
+      <p:nvGrpSpPr>
+        <p:cNvPr id="1" name=""/>
+        <p:cNvGrpSpPr/>
+        <p:nvPr/>
+      </p:nvGrpSpPr>
+      <p:grpSpPr>
+        <a:xfrm>
+          <a:off x="0" y="0"/>
+          <a:ext cx="0" cy="0"/>
+          <a:chOff x="0" y="0"/>
+          <a:chExt cx="0" cy="0"/>
+        </a:xfrm>
+      </p:grpSpPr>
+      <p:sp>
+        <p:nvSpPr>
+          <p:cNvPr id="9" name="Rectangle 8">
+            <a:extLst>
+              <a:ext uri="{FF2B5EF4-FFF2-40B4-BE49-F238E27FC236}">
+                <a16:creationId xmlns:a16="http://schemas.microsoft.com/office/drawing/2014/main" id="{23962611-DFD5-4092-AAFD-559E3DFCE2C9}"/>
+              </a:ext>
+              <a:ext uri="{C183D7F6-B498-43B3-948B-1728B52AA6E4}">
+                <adec:decorative xmlns:adec="http://schemas.microsoft.com/office/drawing/2017/decorative" val="1"/>
+              </a:ext>
+            </a:extLst>
+          </p:cNvPr>
+          <p:cNvSpPr>
+            <a:spLocks noGrp="1" noRot="1" noChangeAspect="1" noMove="1" noResize="1" noEditPoints="1" noAdjustHandles="1" noChangeArrowheads="1" noChangeShapeType="1" noTextEdit="1"/>
+          </p:cNvSpPr>
+          <p:nvPr>
+            <p:extLst>
+              <p:ext uri="{386F3935-93C4-4BCD-93E2-E3B085C9AB24}">
+                <p16:designElem xmlns:p16="http://schemas.microsoft.com/office/powerpoint/2015/main" val="1"/>
+              </p:ext>
+            </p:extLst>
+          </p:nvPr>
+        </p:nvSpPr>
+        <p:spPr>
+          <a:xfrm>
+            <a:off x="393144" y="944661"/>
+            <a:ext cx="9020879" cy="5670352"/>
+          </a:xfrm>
+          <a:prstGeom prst="rect">
+            <a:avLst/>
+          </a:prstGeom>
+          <a:gradFill>
+            <a:gsLst>
+              <a:gs pos="0">
+                <a:schemeClr val="accent1">
+                  <a:lumMod val="90000"/>
+                </a:schemeClr>
+              </a:gs>
+              <a:gs pos="25000">
+                <a:schemeClr val="accent1">
+                  <a:lumMod val="90000"/>
+                </a:schemeClr>
+              </a:gs>
+              <a:gs pos="94000">
+                <a:schemeClr val="bg2">
+                  <a:lumMod val="25000"/>
+                </a:schemeClr>
+              </a:gs>
+              <a:gs pos="100000">
+                <a:schemeClr val="bg2">
+                  <a:lumMod val="25000"/>
+                </a:schemeClr>
+              </a:gs>
+            </a:gsLst>
+            <a:lin ang="4200000" scaled="0"/>
+          </a:gradFill>
+          <a:ln>
+            <a:noFill/>
+          </a:ln>
+        </p:spPr>
+        <p:style>
+          <a:lnRef idx="2">
+            <a:schemeClr val="accent1">
+              <a:shade val="50000"/>
+            </a:schemeClr>
+          </a:lnRef>
+          <a:fillRef idx="1">
+            <a:schemeClr val="accent1"/>
+          </a:fillRef>
+          <a:effectRef idx="0">
+            <a:schemeClr val="accent1"/>
+          </a:effectRef>
+          <a:fontRef idx="minor">
+            <a:schemeClr val="lt1"/>
+          </a:fontRef>
+        </p:style>
+        <p:txBody>
+          <a:bodyPr rtlCol="0" anchor="ctr"/>
+          <a:lstStyle/>
+          <a:p>
+            <a:pPr algn="ctr" defTabSz="756026">
+              <a:defRPr/>
+            </a:pPr>
+            <a:endParaRPr lang="en-US" sz="1488">
+              <a:solidFill>
+                <a:prstClr val="white"/>
+              </a:solidFill>
+              <a:latin typeface="Calibri" panose="020F0502020204030204"/>
+            </a:endParaRPr>
+          </a:p>
+        </p:txBody>
+      </p:sp>
+      <p:pic>
+        <p:nvPicPr>
+          <p:cNvPr id="11" name="Picture 10">
+            <a:extLst>
+              <a:ext uri="{FF2B5EF4-FFF2-40B4-BE49-F238E27FC236}">
+                <a16:creationId xmlns:a16="http://schemas.microsoft.com/office/drawing/2014/main" id="{2270F1FA-0425-408F-9861-80BF5AFB276D}"/>
+              </a:ext>
+              <a:ext uri="{C183D7F6-B498-43B3-948B-1728B52AA6E4}">
+                <adec:decorative xmlns:adec="http://schemas.microsoft.com/office/drawing/2017/decorative" val="1"/>
+              </a:ext>
+            </a:extLst>
+          </p:cNvPr>
+          <p:cNvPicPr>
+            <a:picLocks noGrp="1" noRot="1" noChangeAspect="1" noMove="1" noResize="1" noEditPoints="1" noAdjustHandles="1" noChangeArrowheads="1" noChangeShapeType="1" noCrop="1"/>
+          </p:cNvPicPr>
+          <p:nvPr>
+            <p:extLst>
+              <p:ext uri="{386F3935-93C4-4BCD-93E2-E3B085C9AB24}">
+                <p16:designElem xmlns:p16="http://schemas.microsoft.com/office/powerpoint/2015/main" val="1"/>
+              </p:ext>
+            </p:extLst>
+          </p:nvPr>
+        </p:nvPicPr>
+        <p:blipFill>
+          <a:blip r:embed="rId2">
+            <a:extLst>
+              <a:ext uri="{28A0092B-C50C-407E-A947-70E740481C1C}">
+                <a14:useLocalDpi xmlns:a14="http://schemas.microsoft.com/office/drawing/2010/main" val="0"/>
+              </a:ext>
+            </a:extLst>
+          </a:blip>
+          <a:stretch>
+            <a:fillRect/>
+          </a:stretch>
+        </p:blipFill>
+        <p:spPr>
+          <a:xfrm>
+            <a:off x="-1" y="944661"/>
+            <a:ext cx="10080625" cy="5670352"/>
+          </a:xfrm>
+          <a:prstGeom prst="rect">
+            <a:avLst/>
+          </a:prstGeom>
+        </p:spPr>
+      </p:pic>
+      <p:sp>
+        <p:nvSpPr>
+          <p:cNvPr id="2" name="Title 1"/>
+          <p:cNvSpPr>
+            <a:spLocks noGrp="1"/>
+          </p:cNvSpPr>
+          <p:nvPr>
+            <p:ph type="ctrTitle"/>
+          </p:nvPr>
+        </p:nvSpPr>
+        <p:spPr>
+          <a:xfrm>
+            <a:off x="2516355" y="3199105"/>
+            <a:ext cx="5047914" cy="935537"/>
+          </a:xfrm>
+        </p:spPr>
+        <p:txBody>
+          <a:bodyPr>
+            <a:normAutofit fontScale="90000"/>
+          </a:bodyPr>
+          <a:lstStyle/>
+          <a:p>
+            <a:br>
+              <a:rPr lang="en-US" dirty="0">
+                <a:solidFill>
+                  <a:srgbClr val="FFFFFF"/>
+                </a:solidFill>
+              </a:rPr>
+            </a:br>
+            <a:br>
+              <a:rPr lang="en-US" dirty="0">
+                <a:solidFill>
+                  <a:srgbClr val="FFFFFF"/>
+                </a:solidFill>
+              </a:rPr>
+            </a:br>
+            <a:r>
+              <a:rPr lang="en-US" dirty="0">
+                <a:solidFill>
+                  <a:srgbClr val="FFFFFF"/>
+                </a:solidFill>
+              </a:rPr>
+              <a:t>Thank You!</a:t>
+            </a:r>
+          </a:p>
+        </p:txBody>
+      </p:sp>
+    </p:spTree>
+    <p:extLst>
+      <p:ext uri="{BB962C8B-B14F-4D97-AF65-F5344CB8AC3E}">
+        <p14:creationId xmlns:p14="http://schemas.microsoft.com/office/powerpoint/2010/main" val="3167128273"/>
+      </p:ext>
+    </p:extLst>
+  </p:cSld>
+  <p:clrMapOvr>
+    <a:masterClrMapping/>
+  </p:clrMapOvr>
+</p:sld>
+</file>
+
 <file path=ppt/slides/slide2.xml><?xml version="1.0" encoding="utf-8"?>
 <p:sld xmlns:a="http://schemas.openxmlformats.org/drawingml/2006/main" xmlns:r="http://schemas.openxmlformats.org/officeDocument/2006/relationships" xmlns:p="http://schemas.openxmlformats.org/presentationml/2006/main">
   <p:cSld>
@@ -8733,8 +9151,8 @@
               </a:lnSpc>
             </a:pPr>
             <a:r>
-              <a:rPr lang="en-US" sz="2200" dirty="0"/>
-              <a:t>Text Cleaning</a:t>
+              <a:rPr lang="en-US" sz="2100" dirty="0"/>
+              <a:t>Tokenization</a:t>
             </a:r>
           </a:p>
           <a:p>
@@ -8744,8 +9162,8 @@
               </a:lnSpc>
             </a:pPr>
             <a:r>
-              <a:rPr lang="en-US" sz="2200" dirty="0"/>
-              <a:t>Tokenization</a:t>
+              <a:rPr lang="en-US" sz="2100" dirty="0"/>
+              <a:t>Stop words</a:t>
             </a:r>
           </a:p>
           <a:p>
@@ -8755,8 +9173,34 @@
               </a:lnSpc>
             </a:pPr>
             <a:r>
-              <a:rPr lang="en-US" sz="2200" dirty="0"/>
-              <a:t>Stop words</a:t>
+              <a:rPr lang="en-US" sz="2100" dirty="0"/>
+              <a:t>Word Normalization</a:t>
+            </a:r>
+          </a:p>
+          <a:p>
+            <a:pPr lvl="1">
+              <a:lnSpc>
+                <a:spcPct val="150000"/>
+              </a:lnSpc>
+              <a:buFont typeface="Courier New" panose="02070309020205020404" pitchFamily="49" charset="0"/>
+              <a:buChar char="o"/>
+            </a:pPr>
+            <a:r>
+              <a:rPr lang="en-US" sz="1800" dirty="0"/>
+              <a:t>Stemming</a:t>
+            </a:r>
+          </a:p>
+          <a:p>
+            <a:pPr lvl="1">
+              <a:lnSpc>
+                <a:spcPct val="150000"/>
+              </a:lnSpc>
+              <a:buFont typeface="Courier New" panose="02070309020205020404" pitchFamily="49" charset="0"/>
+              <a:buChar char="o"/>
+            </a:pPr>
+            <a:r>
+              <a:rPr lang="en-US" sz="1800" dirty="0"/>
+              <a:t>Lemmatization</a:t>
             </a:r>
           </a:p>
           <a:p>
@@ -8766,8 +9210,8 @@
               </a:lnSpc>
             </a:pPr>
             <a:r>
-              <a:rPr lang="en-US" sz="2200" dirty="0"/>
-              <a:t>Text Normalization</a:t>
+              <a:rPr lang="en-US" sz="2100" dirty="0"/>
+              <a:t>POS Tagging</a:t>
             </a:r>
           </a:p>
           <a:p>
@@ -8777,8 +9221,8 @@
               </a:lnSpc>
             </a:pPr>
             <a:r>
-              <a:rPr lang="en-US" sz="2200" dirty="0"/>
-              <a:t>Removing URLs/HTML tags</a:t>
+              <a:rPr lang="en-US" sz="2100" dirty="0"/>
+              <a:t>Chunking</a:t>
             </a:r>
           </a:p>
           <a:p>
@@ -8788,40 +9232,7 @@
               </a:lnSpc>
             </a:pPr>
             <a:r>
-              <a:rPr lang="en-US" sz="2200" dirty="0"/>
-              <a:t>Emoticons</a:t>
-            </a:r>
-          </a:p>
-          <a:p>
-            <a:pPr>
-              <a:lnSpc>
-                <a:spcPct val="150000"/>
-              </a:lnSpc>
-            </a:pPr>
-            <a:r>
-              <a:rPr lang="en-US" sz="2200" dirty="0"/>
-              <a:t>POS Tagging</a:t>
-            </a:r>
-          </a:p>
-          <a:p>
-            <a:pPr>
-              <a:lnSpc>
-                <a:spcPct val="150000"/>
-              </a:lnSpc>
-            </a:pPr>
-            <a:r>
-              <a:rPr lang="en-US" sz="2200" dirty="0"/>
-              <a:t>Chunking</a:t>
-            </a:r>
-          </a:p>
-          <a:p>
-            <a:pPr>
-              <a:lnSpc>
-                <a:spcPct val="150000"/>
-              </a:lnSpc>
-            </a:pPr>
-            <a:r>
-              <a:rPr lang="en-US" sz="2200" dirty="0"/>
+              <a:rPr lang="en-US" sz="2100" dirty="0"/>
               <a:t>NER Tagging</a:t>
             </a:r>
           </a:p>
@@ -8926,7 +9337,7 @@
               </a:lnSpc>
             </a:pPr>
             <a:r>
-              <a:rPr lang="en-US" sz="2400" dirty="0"/>
+              <a:rPr lang="en-US" sz="2100" dirty="0"/>
               <a:t>Process of segmenting a piece of text into smaller units called tokens.</a:t>
             </a:r>
           </a:p>
@@ -8937,7 +9348,7 @@
               </a:lnSpc>
             </a:pPr>
             <a:r>
-              <a:rPr lang="en-US" sz="2400" dirty="0"/>
+              <a:rPr lang="en-US" sz="2100" dirty="0"/>
               <a:t>The tokens can later be used to create a dictionary of words.</a:t>
             </a:r>
           </a:p>
@@ -8948,11 +9359,11 @@
               </a:lnSpc>
             </a:pPr>
             <a:r>
-              <a:rPr lang="en-US" sz="2400" b="1" dirty="0"/>
+              <a:rPr lang="en-US" sz="2100" b="1" dirty="0"/>
               <a:t>Example:</a:t>
             </a:r>
             <a:r>
-              <a:rPr lang="en-US" sz="2400" dirty="0"/>
+              <a:rPr lang="en-US" sz="2100" dirty="0"/>
               <a:t> I have a can opener, but I can’t open these cans.</a:t>
             </a:r>
           </a:p>
@@ -8965,11 +9376,11 @@
               <a:buChar char="o"/>
             </a:pPr>
             <a:r>
-              <a:rPr lang="en-US" sz="2000" b="1" dirty="0"/>
+              <a:rPr lang="en-US" sz="2100" b="1" dirty="0"/>
               <a:t>Word Token:</a:t>
             </a:r>
             <a:r>
-              <a:rPr lang="en-US" sz="2000" dirty="0"/>
+              <a:rPr lang="en-US" sz="2100" dirty="0"/>
               <a:t> An occurrence of a word (11 tokens).</a:t>
             </a:r>
           </a:p>
@@ -8982,19 +9393,19 @@
               <a:buChar char="o"/>
             </a:pPr>
             <a:r>
-              <a:rPr lang="en-US" sz="2000" b="1" dirty="0"/>
+              <a:rPr lang="en-US" sz="2100" b="1" dirty="0"/>
               <a:t>Word Type:</a:t>
             </a:r>
             <a:r>
-              <a:rPr lang="en-US" sz="2000" dirty="0"/>
+              <a:rPr lang="en-US" sz="2100" dirty="0"/>
               <a:t> </a:t>
             </a:r>
             <a:r>
-              <a:rPr lang="en-US" sz="2000" i="1" dirty="0"/>
+              <a:rPr lang="en-US" sz="2100" i="1" dirty="0"/>
               <a:t>Unique</a:t>
             </a:r>
             <a:r>
-              <a:rPr lang="en-US" sz="2000" dirty="0"/>
+              <a:rPr lang="en-US" sz="2100" dirty="0"/>
               <a:t> tokens (10).</a:t>
             </a:r>
           </a:p>
@@ -9005,7 +9416,7 @@
               </a:lnSpc>
             </a:pPr>
             <a:r>
-              <a:rPr lang="en-US" sz="2400" b="1" dirty="0"/>
+              <a:rPr lang="en-US" sz="2100" b="1" dirty="0"/>
               <a:t>Issues:</a:t>
             </a:r>
           </a:p>
@@ -9018,7 +9429,7 @@
               <a:buAutoNum type="arabicPeriod"/>
             </a:pPr>
             <a:r>
-              <a:rPr lang="en-US" sz="2069" dirty="0"/>
+              <a:rPr lang="en-US" sz="2100" dirty="0"/>
               <a:t>What’re, I’m, shouldn’t            What are, I am, should not?</a:t>
             </a:r>
           </a:p>
@@ -9031,16 +9442,8 @@
               <a:buAutoNum type="arabicPeriod"/>
             </a:pPr>
             <a:r>
-              <a:rPr lang="en-US" sz="2069" dirty="0"/>
-              <a:t>San </a:t>
-            </a:r>
-            <a:r>
-              <a:rPr lang="en-US" sz="2069" dirty="0" err="1"/>
-              <a:t>Fransisco</a:t>
-            </a:r>
-            <a:r>
-              <a:rPr lang="en-US" sz="2069" dirty="0"/>
-              <a:t>            one token or two?</a:t>
+              <a:rPr lang="en-US" sz="2100" dirty="0"/>
+              <a:t>San Francisco            one token or two?</a:t>
             </a:r>
           </a:p>
           <a:p>
@@ -9052,12 +9455,8 @@
               <a:buAutoNum type="arabicPeriod"/>
             </a:pPr>
             <a:r>
-              <a:rPr lang="en-US" sz="2069" dirty="0" err="1"/>
-              <a:t>m.p.h</a:t>
-            </a:r>
-            <a:r>
-              <a:rPr lang="en-US" sz="2069" dirty="0"/>
-              <a:t>            three tokens or one?</a:t>
+              <a:rPr lang="en-US" sz="2100" dirty="0"/>
+              <a:t>m.p.h.           three tokens or one?</a:t>
             </a:r>
           </a:p>
           <a:p>
@@ -9068,7 +9467,7 @@
               <a:buFont typeface="+mj-lt"/>
               <a:buAutoNum type="arabicPeriod"/>
             </a:pPr>
-            <a:endParaRPr lang="en-US" sz="2069" dirty="0"/>
+            <a:endParaRPr lang="en-US" sz="2100" dirty="0"/>
           </a:p>
           <a:p>
             <a:pPr marL="378013" lvl="1" indent="0">
@@ -9077,7 +9476,7 @@
               </a:lnSpc>
               <a:buNone/>
             </a:pPr>
-            <a:endParaRPr lang="en-US" sz="2000" dirty="0"/>
+            <a:endParaRPr lang="en-US" sz="2100" dirty="0"/>
           </a:p>
           <a:p>
             <a:pPr lvl="1">
@@ -9087,7 +9486,7 @@
               <a:buFont typeface="Courier New" panose="02070309020205020404" pitchFamily="49" charset="0"/>
               <a:buChar char="o"/>
             </a:pPr>
-            <a:endParaRPr lang="en-US" sz="2069" dirty="0"/>
+            <a:endParaRPr lang="en-US" sz="2100" dirty="0"/>
           </a:p>
         </p:txBody>
       </p:sp>
@@ -9105,7 +9504,7 @@
         </p:nvCxnSpPr>
         <p:spPr>
           <a:xfrm>
-            <a:off x="4277533" y="5793786"/>
+            <a:off x="4308529" y="5034367"/>
             <a:ext cx="340963" cy="0"/>
           </a:xfrm>
           <a:prstGeom prst="straightConnector1">
@@ -9144,7 +9543,7 @@
         </p:nvCxnSpPr>
         <p:spPr>
           <a:xfrm>
-            <a:off x="2430651" y="6847665"/>
+            <a:off x="2446149" y="6088248"/>
             <a:ext cx="340963" cy="0"/>
           </a:xfrm>
           <a:prstGeom prst="straightConnector1">
@@ -9183,7 +9582,7 @@
         </p:nvCxnSpPr>
         <p:spPr>
           <a:xfrm>
-            <a:off x="3221065" y="6318150"/>
+            <a:off x="3267559" y="5558733"/>
             <a:ext cx="340963" cy="0"/>
           </a:xfrm>
           <a:prstGeom prst="straightConnector1">
@@ -9307,11 +9706,11 @@
               </a:lnSpc>
             </a:pPr>
             <a:r>
-              <a:rPr lang="en-US" sz="2400" b="1" dirty="0"/>
+              <a:rPr lang="en-US" sz="2100" b="1" dirty="0"/>
               <a:t>Stop words</a:t>
             </a:r>
             <a:r>
-              <a:rPr lang="en-US" sz="2400" dirty="0"/>
+              <a:rPr lang="en-US" sz="2100" dirty="0"/>
               <a:t> are a set of commonly used words. </a:t>
             </a:r>
           </a:p>
@@ -9322,7 +9721,7 @@
               </a:lnSpc>
             </a:pPr>
             <a:r>
-              <a:rPr lang="en-US" sz="2400" dirty="0"/>
+              <a:rPr lang="en-US" sz="2100" dirty="0"/>
               <a:t>Often removed from the corpus before training models as they occur in abundance, providing little to no unique information that can be used for classification or clustering.</a:t>
             </a:r>
           </a:p>
@@ -9333,31 +9732,31 @@
               </a:lnSpc>
             </a:pPr>
             <a:r>
-              <a:rPr lang="en-US" sz="2400" dirty="0"/>
+              <a:rPr lang="en-US" sz="2100" dirty="0"/>
               <a:t>In English, </a:t>
             </a:r>
             <a:r>
-              <a:rPr lang="en-US" sz="2400" b="1" i="1" dirty="0"/>
+              <a:rPr lang="en-US" sz="2100" b="1" i="1" dirty="0"/>
               <a:t>the</a:t>
             </a:r>
             <a:r>
-              <a:rPr lang="en-US" sz="2400" dirty="0"/>
+              <a:rPr lang="en-US" sz="2100" dirty="0"/>
               <a:t>, </a:t>
             </a:r>
             <a:r>
-              <a:rPr lang="en-US" sz="2400" b="1" i="1" dirty="0"/>
+              <a:rPr lang="en-US" sz="2100" b="1" i="1" dirty="0"/>
               <a:t>is</a:t>
             </a:r>
             <a:r>
-              <a:rPr lang="en-US" sz="2400" dirty="0"/>
+              <a:rPr lang="en-US" sz="2100" dirty="0"/>
               <a:t> and </a:t>
             </a:r>
             <a:r>
-              <a:rPr lang="en-US" sz="2400" b="1" i="1" dirty="0" err="1"/>
+              <a:rPr lang="en-US" sz="2100" b="1" i="1" dirty="0" err="1"/>
               <a:t>and</a:t>
             </a:r>
             <a:r>
-              <a:rPr lang="en-US" sz="2400" dirty="0"/>
+              <a:rPr lang="en-US" sz="2100" dirty="0"/>
               <a:t> would easily qualify as stop words. </a:t>
             </a:r>
           </a:p>
@@ -9368,7 +9767,7 @@
               </a:lnSpc>
             </a:pPr>
             <a:r>
-              <a:rPr lang="en-US" sz="2400" dirty="0"/>
+              <a:rPr lang="en-US" sz="2100" dirty="0"/>
               <a:t>These words, just like punctuations, help just in maintaining the structure and do not contribute much to the meaning of a sentence. </a:t>
             </a:r>
           </a:p>
@@ -9479,7 +9878,7 @@
               </a:spcAft>
             </a:pPr>
             <a:r>
-              <a:rPr kumimoji="0" lang="en-US" altLang="en-US" sz="2400" i="0" u="none" strike="noStrike" cap="none" normalizeH="0" baseline="0" dirty="0">
+              <a:rPr kumimoji="0" lang="en-US" altLang="en-US" sz="2100" i="0" u="none" strike="noStrike" cap="none" normalizeH="0" baseline="0" dirty="0">
                 <a:ln>
                   <a:noFill/>
                 </a:ln>
@@ -9505,7 +9904,7 @@
               </a:spcAft>
             </a:pPr>
             <a:r>
-              <a:rPr kumimoji="0" lang="en-US" altLang="en-US" sz="2400" b="1" i="0" u="none" strike="noStrike" cap="none" normalizeH="0" baseline="0" dirty="0">
+              <a:rPr kumimoji="0" lang="en-US" altLang="en-US" sz="2100" b="1" i="0" u="none" strike="noStrike" cap="none" normalizeH="0" baseline="0" dirty="0">
                 <a:ln>
                   <a:noFill/>
                 </a:ln>
@@ -9518,7 +9917,7 @@
               <a:t>Goal: </a:t>
             </a:r>
             <a:r>
-              <a:rPr kumimoji="0" lang="en-US" altLang="en-US" sz="2400" b="0" i="0" u="none" strike="noStrike" cap="none" normalizeH="0" baseline="0" dirty="0">
+              <a:rPr kumimoji="0" lang="en-US" altLang="en-US" sz="2100" b="0" i="0" u="none" strike="noStrike" cap="none" normalizeH="0" baseline="0" dirty="0">
                 <a:ln>
                   <a:noFill/>
                 </a:ln>
@@ -9544,7 +9943,7 @@
               </a:spcAft>
             </a:pPr>
             <a:r>
-              <a:rPr lang="en-US" altLang="en-US" sz="2400" b="1" dirty="0">
+              <a:rPr lang="en-US" altLang="en-US" sz="2100" b="1" dirty="0">
                 <a:solidFill>
                   <a:srgbClr val="000000"/>
                 </a:solidFill>
@@ -9568,7 +9967,7 @@
               <a:buAutoNum type="arabicPeriod"/>
             </a:pPr>
             <a:r>
-              <a:rPr kumimoji="0" lang="en-US" altLang="en-US" sz="2069" b="0" i="0" u="none" strike="noStrike" cap="none" normalizeH="0" baseline="0" dirty="0">
+              <a:rPr kumimoji="0" lang="en-US" altLang="en-US" sz="2100" b="0" i="0" u="none" strike="noStrike" cap="none" normalizeH="0" baseline="0" dirty="0">
                 <a:ln>
                   <a:noFill/>
                 </a:ln>
@@ -9596,7 +9995,7 @@
               <a:buAutoNum type="arabicPeriod"/>
             </a:pPr>
             <a:r>
-              <a:rPr kumimoji="0" lang="en-US" altLang="en-US" sz="2069" b="0" i="0" u="none" strike="noStrike" cap="none" normalizeH="0" baseline="0" dirty="0">
+              <a:rPr kumimoji="0" lang="en-US" altLang="en-US" sz="2100" b="0" i="0" u="none" strike="noStrike" cap="none" normalizeH="0" baseline="0" dirty="0">
                 <a:ln>
                   <a:noFill/>
                 </a:ln>
@@ -9608,16 +10007,6 @@
               </a:rPr>
               <a:t>car, cars, car's, cars’          car</a:t>
             </a:r>
-            <a:endParaRPr kumimoji="0" lang="en-US" altLang="en-US" sz="2400" b="0" i="0" u="none" strike="noStrike" cap="none" normalizeH="0" baseline="0" dirty="0">
-              <a:ln>
-                <a:noFill/>
-              </a:ln>
-              <a:solidFill>
-                <a:srgbClr val="000000"/>
-              </a:solidFill>
-              <a:effectLst/>
-              <a:cs typeface="Times New Roman" panose="02020603050405020304" pitchFamily="18" charset="0"/>
-            </a:endParaRPr>
           </a:p>
           <a:p>
             <a:pPr defTabSz="914400" eaLnBrk="0" fontAlgn="base" hangingPunct="0">
@@ -9632,7 +10021,7 @@
               </a:spcAft>
             </a:pPr>
             <a:r>
-              <a:rPr kumimoji="0" lang="en-US" altLang="en-US" sz="2400" b="0" i="0" u="none" strike="noStrike" cap="none" normalizeH="0" baseline="0" dirty="0">
+              <a:rPr kumimoji="0" lang="en-US" altLang="en-US" sz="2100" b="0" i="0" u="none" strike="noStrike" cap="none" normalizeH="0" baseline="0" dirty="0">
                 <a:ln>
                   <a:noFill/>
                 </a:ln>
@@ -9661,7 +10050,7 @@
         </p:nvCxnSpPr>
         <p:spPr>
           <a:xfrm>
-            <a:off x="2727702" y="5220345"/>
+            <a:off x="2758698" y="4817390"/>
             <a:ext cx="340963" cy="0"/>
           </a:xfrm>
           <a:prstGeom prst="straightConnector1">
@@ -9700,7 +10089,7 @@
         </p:nvCxnSpPr>
         <p:spPr>
           <a:xfrm>
-            <a:off x="3750590" y="5698206"/>
+            <a:off x="3781586" y="5295252"/>
             <a:ext cx="340963" cy="0"/>
           </a:xfrm>
           <a:prstGeom prst="straightConnector1">
@@ -9824,11 +10213,11 @@
               </a:lnSpc>
             </a:pPr>
             <a:r>
-              <a:rPr lang="en-US" sz="2400" b="1" dirty="0"/>
+              <a:rPr lang="en-US" sz="2100" b="1" dirty="0"/>
               <a:t>Stemming</a:t>
             </a:r>
             <a:r>
-              <a:rPr lang="en-US" sz="2400" dirty="0"/>
+              <a:rPr lang="en-US" sz="2100" dirty="0"/>
               <a:t> is the process of reducing inﬂection in words to their root forms, such as mapping a group of words to the same stem even if the stem itself is not a valid word in the language. </a:t>
             </a:r>
           </a:p>
@@ -9839,7 +10228,7 @@
               </a:lnSpc>
             </a:pPr>
             <a:r>
-              <a:rPr lang="en-US" sz="2400" dirty="0"/>
+              <a:rPr lang="en-US" sz="2100" dirty="0"/>
               <a:t>Hence, stemming words in a sentence may result in words that are not actual English words: a drawback.</a:t>
             </a:r>
           </a:p>
@@ -9850,15 +10239,15 @@
               </a:lnSpc>
             </a:pPr>
             <a:r>
-              <a:rPr lang="en-US" sz="2400" dirty="0"/>
+              <a:rPr lang="en-US" sz="2100" dirty="0"/>
               <a:t>However, stemming is much faster than </a:t>
             </a:r>
             <a:r>
-              <a:rPr lang="en-US" sz="2400" b="1" dirty="0"/>
+              <a:rPr lang="en-US" sz="2100" b="1" dirty="0"/>
               <a:t>Lemmatization</a:t>
             </a:r>
             <a:r>
-              <a:rPr lang="en-US" sz="2400" dirty="0"/>
+              <a:rPr lang="en-US" sz="2100" dirty="0"/>
               <a:t> as it has a rule-based algorithm (Porter’s algorithm).</a:t>
             </a:r>
           </a:p>
@@ -9869,51 +10258,51 @@
               </a:lnSpc>
             </a:pPr>
             <a:r>
-              <a:rPr lang="en-US" sz="2400" b="1" dirty="0"/>
+              <a:rPr lang="en-US" sz="2100" b="1" dirty="0"/>
               <a:t>Example:</a:t>
             </a:r>
             <a:r>
-              <a:rPr lang="en-US" sz="2400" dirty="0"/>
+              <a:rPr lang="en-US" sz="2100" dirty="0"/>
               <a:t>  </a:t>
             </a:r>
             <a:r>
-              <a:rPr lang="en-US" sz="2400" i="1" dirty="0"/>
+              <a:rPr lang="en-US" sz="2100" i="1" dirty="0"/>
               <a:t>argue</a:t>
             </a:r>
             <a:r>
-              <a:rPr lang="en-US" sz="2400" dirty="0"/>
+              <a:rPr lang="en-US" sz="2100" dirty="0"/>
               <a:t>, </a:t>
             </a:r>
             <a:r>
-              <a:rPr lang="en-US" sz="2400" i="1" dirty="0"/>
+              <a:rPr lang="en-US" sz="2100" i="1" dirty="0"/>
               <a:t>argued</a:t>
             </a:r>
             <a:r>
-              <a:rPr lang="en-US" sz="2400" dirty="0"/>
+              <a:rPr lang="en-US" sz="2100" dirty="0"/>
               <a:t>, </a:t>
             </a:r>
             <a:r>
-              <a:rPr lang="en-US" sz="2400" i="1" dirty="0"/>
+              <a:rPr lang="en-US" sz="2100" i="1" dirty="0"/>
               <a:t>argues </a:t>
             </a:r>
             <a:r>
-              <a:rPr lang="en-US" sz="2400" dirty="0"/>
+              <a:rPr lang="en-US" sz="2100" dirty="0"/>
               <a:t>and </a:t>
             </a:r>
             <a:r>
-              <a:rPr lang="en-US" sz="2400" i="1" dirty="0"/>
+              <a:rPr lang="en-US" sz="2100" i="1" dirty="0"/>
               <a:t>arguing </a:t>
             </a:r>
             <a:r>
-              <a:rPr lang="en-US" sz="2400" dirty="0"/>
+              <a:rPr lang="en-US" sz="2100" dirty="0"/>
               <a:t>are reduced to the stem </a:t>
             </a:r>
             <a:r>
-              <a:rPr lang="en-US" sz="2400" b="1" i="1" dirty="0" err="1"/>
+              <a:rPr lang="en-US" sz="2100" b="1" i="1" dirty="0" err="1"/>
               <a:t>argu</a:t>
             </a:r>
             <a:r>
-              <a:rPr lang="en-US" sz="2400" dirty="0"/>
+              <a:rPr lang="en-US" sz="2100" dirty="0"/>
               <a:t>.</a:t>
             </a:r>
           </a:p>
@@ -9923,7 +10312,7 @@
                 <a:spcPct val="150000"/>
               </a:lnSpc>
             </a:pPr>
-            <a:endParaRPr lang="en-US" sz="2400" dirty="0"/>
+            <a:endParaRPr lang="en-US" sz="2100" dirty="0"/>
           </a:p>
         </p:txBody>
       </p:sp>
@@ -10026,11 +10415,11 @@
               </a:lnSpc>
             </a:pPr>
             <a:r>
-              <a:rPr lang="en-US" sz="2400" b="1" dirty="0"/>
+              <a:rPr lang="en-US" sz="2100" b="1" dirty="0"/>
               <a:t>Lemmatization</a:t>
             </a:r>
             <a:r>
-              <a:rPr lang="en-US" sz="2400" dirty="0"/>
+              <a:rPr lang="en-US" sz="2100" dirty="0"/>
               <a:t>, unlike Stemming, reduces the inﬂected words to their respective roots (lemmas), while also ensuring that the root word belongs to the language. </a:t>
             </a:r>
           </a:p>
@@ -10041,7 +10430,7 @@
               </a:lnSpc>
             </a:pPr>
             <a:r>
-              <a:rPr lang="en-US" sz="2400" dirty="0"/>
+              <a:rPr lang="en-US" sz="2100" dirty="0"/>
               <a:t>A lemma (root word) is the dictionary form of a set of words. </a:t>
             </a:r>
           </a:p>
@@ -10052,7 +10441,7 @@
               </a:lnSpc>
             </a:pPr>
             <a:r>
-              <a:rPr lang="en-US" sz="2400" dirty="0"/>
+              <a:rPr lang="en-US" sz="2100" dirty="0"/>
               <a:t>Because lemmatization returns an actual word of the language, the algorithm is a bit more complex and consequently, slower than stemming.</a:t>
             </a:r>
           </a:p>
@@ -10063,51 +10452,51 @@
               </a:lnSpc>
             </a:pPr>
             <a:r>
-              <a:rPr lang="en-US" sz="2400" b="1" dirty="0"/>
+              <a:rPr lang="en-US" sz="2100" b="1" dirty="0"/>
               <a:t>Example:</a:t>
             </a:r>
             <a:r>
-              <a:rPr lang="en-US" sz="2400" dirty="0"/>
+              <a:rPr lang="en-US" sz="2100" dirty="0"/>
               <a:t> </a:t>
             </a:r>
             <a:r>
-              <a:rPr lang="en-US" sz="2400" i="1" dirty="0"/>
+              <a:rPr lang="en-US" sz="2100" i="1" dirty="0"/>
               <a:t>runs</a:t>
             </a:r>
             <a:r>
-              <a:rPr lang="en-US" sz="2400" dirty="0"/>
+              <a:rPr lang="en-US" sz="2100" dirty="0"/>
               <a:t>, </a:t>
             </a:r>
             <a:r>
-              <a:rPr lang="en-US" sz="2400" i="1" dirty="0"/>
+              <a:rPr lang="en-US" sz="2100" i="1" dirty="0"/>
               <a:t>running</a:t>
             </a:r>
             <a:r>
-              <a:rPr lang="en-US" sz="2400" dirty="0"/>
+              <a:rPr lang="en-US" sz="2100" dirty="0"/>
               <a:t>, </a:t>
             </a:r>
             <a:r>
-              <a:rPr lang="en-US" sz="2400" i="1" dirty="0"/>
+              <a:rPr lang="en-US" sz="2100" i="1" dirty="0"/>
               <a:t>ran </a:t>
             </a:r>
             <a:r>
-              <a:rPr lang="en-US" sz="2400" dirty="0"/>
+              <a:rPr lang="en-US" sz="2100" dirty="0"/>
               <a:t>are all forms of the word </a:t>
             </a:r>
             <a:r>
-              <a:rPr lang="en-US" sz="2400" b="1" i="1" dirty="0"/>
+              <a:rPr lang="en-US" sz="2100" b="1" i="1" dirty="0"/>
               <a:t>run</a:t>
             </a:r>
             <a:r>
-              <a:rPr lang="en-US" sz="2400" dirty="0"/>
+              <a:rPr lang="en-US" sz="2100" dirty="0"/>
               <a:t>, and hence, </a:t>
             </a:r>
             <a:r>
-              <a:rPr lang="en-US" sz="2400" i="1" dirty="0"/>
+              <a:rPr lang="en-US" sz="2100" i="1" dirty="0"/>
               <a:t>run</a:t>
             </a:r>
             <a:r>
-              <a:rPr lang="en-US" sz="2400" dirty="0"/>
+              <a:rPr lang="en-US" sz="2100" dirty="0"/>
               <a:t> is the lemma of all these words. </a:t>
             </a:r>
           </a:p>
@@ -10129,14 +10518,6 @@
 <file path=ppt/slides/slide8.xml><?xml version="1.0" encoding="utf-8"?>
 <p:sld xmlns:a="http://schemas.openxmlformats.org/drawingml/2006/main" xmlns:r="http://schemas.openxmlformats.org/officeDocument/2006/relationships" xmlns:p="http://schemas.openxmlformats.org/presentationml/2006/main">
   <p:cSld>
-    <p:bg>
-      <p:bgPr>
-        <a:solidFill>
-          <a:schemeClr val="bg1"/>
-        </a:solidFill>
-        <a:effectLst/>
-      </p:bgPr>
-    </p:bg>
     <p:spTree>
       <p:nvGrpSpPr>
         <p:cNvPr id="1" name=""/>
@@ -10153,184 +10534,105 @@
       </p:grpSpPr>
       <p:sp>
         <p:nvSpPr>
-          <p:cNvPr id="9" name="Rectangle 8">
+          <p:cNvPr id="2" name="Title 1">
             <a:extLst>
               <a:ext uri="{FF2B5EF4-FFF2-40B4-BE49-F238E27FC236}">
-                <a16:creationId xmlns:a16="http://schemas.microsoft.com/office/drawing/2014/main" id="{23962611-DFD5-4092-AAFD-559E3DFCE2C9}"/>
-              </a:ext>
-              <a:ext uri="{C183D7F6-B498-43B3-948B-1728B52AA6E4}">
-                <adec:decorative xmlns:adec="http://schemas.microsoft.com/office/drawing/2017/decorative" val="1"/>
+                <a16:creationId xmlns:a16="http://schemas.microsoft.com/office/drawing/2014/main" id="{B10FDB6E-2B3B-4240-9DDD-9566C1D6C56D}"/>
               </a:ext>
             </a:extLst>
           </p:cNvPr>
           <p:cNvSpPr>
-            <a:spLocks noGrp="1" noRot="1" noChangeAspect="1" noMove="1" noResize="1" noEditPoints="1" noAdjustHandles="1" noChangeArrowheads="1" noChangeShapeType="1" noTextEdit="1"/>
-          </p:cNvSpPr>
-          <p:nvPr>
-            <p:extLst>
-              <p:ext uri="{386F3935-93C4-4BCD-93E2-E3B085C9AB24}">
-                <p16:designElem xmlns:p16="http://schemas.microsoft.com/office/powerpoint/2015/main" val="1"/>
-              </p:ext>
-            </p:extLst>
-          </p:nvPr>
-        </p:nvSpPr>
-        <p:spPr>
-          <a:xfrm>
-            <a:off x="393144" y="944661"/>
-            <a:ext cx="9020879" cy="5670352"/>
-          </a:xfrm>
-          <a:prstGeom prst="rect">
-            <a:avLst/>
-          </a:prstGeom>
-          <a:gradFill>
-            <a:gsLst>
-              <a:gs pos="0">
-                <a:schemeClr val="accent1">
-                  <a:lumMod val="90000"/>
-                </a:schemeClr>
-              </a:gs>
-              <a:gs pos="25000">
-                <a:schemeClr val="accent1">
-                  <a:lumMod val="90000"/>
-                </a:schemeClr>
-              </a:gs>
-              <a:gs pos="94000">
-                <a:schemeClr val="bg2">
-                  <a:lumMod val="25000"/>
-                </a:schemeClr>
-              </a:gs>
-              <a:gs pos="100000">
-                <a:schemeClr val="bg2">
-                  <a:lumMod val="25000"/>
-                </a:schemeClr>
-              </a:gs>
-            </a:gsLst>
-            <a:lin ang="4200000" scaled="0"/>
-          </a:gradFill>
-          <a:ln>
-            <a:noFill/>
-          </a:ln>
-        </p:spPr>
-        <p:style>
-          <a:lnRef idx="2">
-            <a:schemeClr val="accent1">
-              <a:shade val="50000"/>
-            </a:schemeClr>
-          </a:lnRef>
-          <a:fillRef idx="1">
-            <a:schemeClr val="accent1"/>
-          </a:fillRef>
-          <a:effectRef idx="0">
-            <a:schemeClr val="accent1"/>
-          </a:effectRef>
-          <a:fontRef idx="minor">
-            <a:schemeClr val="lt1"/>
-          </a:fontRef>
-        </p:style>
-        <p:txBody>
-          <a:bodyPr rtlCol="0" anchor="ctr"/>
-          <a:lstStyle/>
-          <a:p>
-            <a:pPr algn="ctr" defTabSz="756026">
-              <a:defRPr/>
-            </a:pPr>
-            <a:endParaRPr lang="en-US" sz="1488">
-              <a:solidFill>
-                <a:prstClr val="white"/>
-              </a:solidFill>
-              <a:latin typeface="Calibri" panose="020F0502020204030204"/>
-            </a:endParaRPr>
-          </a:p>
-        </p:txBody>
-      </p:sp>
-      <p:pic>
-        <p:nvPicPr>
-          <p:cNvPr id="11" name="Picture 10">
+            <a:spLocks noGrp="1"/>
+          </p:cNvSpPr>
+          <p:nvPr>
+            <p:ph type="title"/>
+          </p:nvPr>
+        </p:nvSpPr>
+        <p:spPr>
+          <a:xfrm>
+            <a:off x="693043" y="402483"/>
+            <a:ext cx="8694539" cy="837381"/>
+          </a:xfrm>
+        </p:spPr>
+        <p:txBody>
+          <a:bodyPr>
+            <a:normAutofit/>
+          </a:bodyPr>
+          <a:lstStyle/>
+          <a:p>
+            <a:r>
+              <a:rPr lang="en-US" sz="4400" dirty="0"/>
+              <a:t>POS Tagging</a:t>
+            </a:r>
+          </a:p>
+        </p:txBody>
+      </p:sp>
+      <p:sp>
+        <p:nvSpPr>
+          <p:cNvPr id="3" name="Content Placeholder 2">
             <a:extLst>
               <a:ext uri="{FF2B5EF4-FFF2-40B4-BE49-F238E27FC236}">
-                <a16:creationId xmlns:a16="http://schemas.microsoft.com/office/drawing/2014/main" id="{2270F1FA-0425-408F-9861-80BF5AFB276D}"/>
-              </a:ext>
-              <a:ext uri="{C183D7F6-B498-43B3-948B-1728B52AA6E4}">
-                <adec:decorative xmlns:adec="http://schemas.microsoft.com/office/drawing/2017/decorative" val="1"/>
+                <a16:creationId xmlns:a16="http://schemas.microsoft.com/office/drawing/2014/main" id="{C120D28A-A614-417F-9732-EA1F29E45085}"/>
               </a:ext>
             </a:extLst>
           </p:cNvPr>
-          <p:cNvPicPr>
-            <a:picLocks noGrp="1" noRot="1" noChangeAspect="1" noMove="1" noResize="1" noEditPoints="1" noAdjustHandles="1" noChangeArrowheads="1" noChangeShapeType="1" noCrop="1"/>
-          </p:cNvPicPr>
-          <p:nvPr>
-            <p:extLst>
-              <p:ext uri="{386F3935-93C4-4BCD-93E2-E3B085C9AB24}">
-                <p16:designElem xmlns:p16="http://schemas.microsoft.com/office/powerpoint/2015/main" val="1"/>
-              </p:ext>
-            </p:extLst>
-          </p:nvPr>
-        </p:nvPicPr>
-        <p:blipFill>
-          <a:blip r:embed="rId2">
-            <a:extLst>
-              <a:ext uri="{28A0092B-C50C-407E-A947-70E740481C1C}">
-                <a14:useLocalDpi xmlns:a14="http://schemas.microsoft.com/office/drawing/2010/main" val="0"/>
-              </a:ext>
-            </a:extLst>
-          </a:blip>
-          <a:stretch>
-            <a:fillRect/>
-          </a:stretch>
-        </p:blipFill>
-        <p:spPr>
-          <a:xfrm>
-            <a:off x="-1" y="944661"/>
-            <a:ext cx="10080625" cy="5670352"/>
-          </a:xfrm>
-          <a:prstGeom prst="rect">
-            <a:avLst/>
-          </a:prstGeom>
-        </p:spPr>
-      </p:pic>
-      <p:sp>
-        <p:nvSpPr>
-          <p:cNvPr id="2" name="Title 1"/>
-          <p:cNvSpPr>
-            <a:spLocks noGrp="1"/>
-          </p:cNvSpPr>
-          <p:nvPr>
-            <p:ph type="ctrTitle"/>
-          </p:nvPr>
-        </p:nvSpPr>
-        <p:spPr>
-          <a:xfrm>
-            <a:off x="2516355" y="3199105"/>
-            <a:ext cx="5047914" cy="935537"/>
+          <p:cNvSpPr>
+            <a:spLocks noGrp="1"/>
+          </p:cNvSpPr>
+          <p:nvPr>
+            <p:ph idx="1"/>
+          </p:nvPr>
+        </p:nvSpPr>
+        <p:spPr>
+          <a:xfrm>
+            <a:off x="693042" y="1779280"/>
+            <a:ext cx="8694539" cy="5377912"/>
           </a:xfrm>
         </p:spPr>
         <p:txBody>
           <a:bodyPr>
-            <a:normAutofit fontScale="90000"/>
+            <a:noAutofit/>
           </a:bodyPr>
           <a:lstStyle/>
           <a:p>
-            <a:br>
-              <a:rPr lang="en-US" dirty="0">
-                <a:solidFill>
-                  <a:srgbClr val="FFFFFF"/>
-                </a:solidFill>
-              </a:rPr>
-            </a:br>
-            <a:br>
-              <a:rPr lang="en-US" dirty="0">
-                <a:solidFill>
-                  <a:srgbClr val="FFFFFF"/>
-                </a:solidFill>
-              </a:rPr>
-            </a:br>
-            <a:r>
-              <a:rPr lang="en-US" dirty="0">
-                <a:solidFill>
-                  <a:srgbClr val="FFFFFF"/>
-                </a:solidFill>
-              </a:rPr>
-              <a:t>Thank You!</a:t>
+            <a:pPr>
+              <a:lnSpc>
+                <a:spcPct val="150000"/>
+              </a:lnSpc>
+            </a:pPr>
+            <a:r>
+              <a:rPr lang="en-US" sz="2100" dirty="0"/>
+              <a:t>The </a:t>
+            </a:r>
+            <a:r>
+              <a:rPr lang="en-US" sz="2100" b="1" dirty="0"/>
+              <a:t>part of speech</a:t>
+            </a:r>
+            <a:r>
+              <a:rPr lang="en-US" sz="2100" dirty="0"/>
+              <a:t> explains how a word is used in a sentence – nouns, pronouns, adjectives, verbs, conjunctions, etc.</a:t>
+            </a:r>
+          </a:p>
+          <a:p>
+            <a:pPr>
+              <a:lnSpc>
+                <a:spcPct val="150000"/>
+              </a:lnSpc>
+            </a:pPr>
+            <a:r>
+              <a:rPr lang="en-US" sz="2100" dirty="0"/>
+              <a:t>POS tagging is a supervised learning solution that tags/classifies each word into one of the categories (parts of speech).</a:t>
+            </a:r>
+          </a:p>
+          <a:p>
+            <a:pPr>
+              <a:lnSpc>
+                <a:spcPct val="150000"/>
+              </a:lnSpc>
+            </a:pPr>
+            <a:r>
+              <a:rPr lang="en-US" sz="2100" dirty="0"/>
+              <a:t>Works on top of word tokens.</a:t>
             </a:r>
           </a:p>
         </p:txBody>
@@ -10338,7 +10640,213 @@
     </p:spTree>
     <p:extLst>
       <p:ext uri="{BB962C8B-B14F-4D97-AF65-F5344CB8AC3E}">
-        <p14:creationId xmlns:p14="http://schemas.microsoft.com/office/powerpoint/2010/main" val="3167128273"/>
+        <p14:creationId xmlns:p14="http://schemas.microsoft.com/office/powerpoint/2010/main" val="196090842"/>
+      </p:ext>
+    </p:extLst>
+  </p:cSld>
+  <p:clrMapOvr>
+    <a:masterClrMapping/>
+  </p:clrMapOvr>
+</p:sld>
+</file>
+
+<file path=ppt/slides/slide9.xml><?xml version="1.0" encoding="utf-8"?>
+<p:sld xmlns:a="http://schemas.openxmlformats.org/drawingml/2006/main" xmlns:r="http://schemas.openxmlformats.org/officeDocument/2006/relationships" xmlns:p="http://schemas.openxmlformats.org/presentationml/2006/main">
+  <p:cSld>
+    <p:spTree>
+      <p:nvGrpSpPr>
+        <p:cNvPr id="1" name=""/>
+        <p:cNvGrpSpPr/>
+        <p:nvPr/>
+      </p:nvGrpSpPr>
+      <p:grpSpPr>
+        <a:xfrm>
+          <a:off x="0" y="0"/>
+          <a:ext cx="0" cy="0"/>
+          <a:chOff x="0" y="0"/>
+          <a:chExt cx="0" cy="0"/>
+        </a:xfrm>
+      </p:grpSpPr>
+      <p:sp>
+        <p:nvSpPr>
+          <p:cNvPr id="2" name="Title 1">
+            <a:extLst>
+              <a:ext uri="{FF2B5EF4-FFF2-40B4-BE49-F238E27FC236}">
+                <a16:creationId xmlns:a16="http://schemas.microsoft.com/office/drawing/2014/main" id="{B10FDB6E-2B3B-4240-9DDD-9566C1D6C56D}"/>
+              </a:ext>
+            </a:extLst>
+          </p:cNvPr>
+          <p:cNvSpPr>
+            <a:spLocks noGrp="1"/>
+          </p:cNvSpPr>
+          <p:nvPr>
+            <p:ph type="title"/>
+          </p:nvPr>
+        </p:nvSpPr>
+        <p:spPr>
+          <a:xfrm>
+            <a:off x="693043" y="402483"/>
+            <a:ext cx="8694539" cy="837381"/>
+          </a:xfrm>
+        </p:spPr>
+        <p:txBody>
+          <a:bodyPr>
+            <a:normAutofit/>
+          </a:bodyPr>
+          <a:lstStyle/>
+          <a:p>
+            <a:r>
+              <a:rPr lang="en-US" sz="4400" dirty="0"/>
+              <a:t>Chunking</a:t>
+            </a:r>
+          </a:p>
+        </p:txBody>
+      </p:sp>
+      <p:sp>
+        <p:nvSpPr>
+          <p:cNvPr id="3" name="Content Placeholder 2">
+            <a:extLst>
+              <a:ext uri="{FF2B5EF4-FFF2-40B4-BE49-F238E27FC236}">
+                <a16:creationId xmlns:a16="http://schemas.microsoft.com/office/drawing/2014/main" id="{C120D28A-A614-417F-9732-EA1F29E45085}"/>
+              </a:ext>
+            </a:extLst>
+          </p:cNvPr>
+          <p:cNvSpPr>
+            <a:spLocks noGrp="1"/>
+          </p:cNvSpPr>
+          <p:nvPr>
+            <p:ph idx="1"/>
+          </p:nvPr>
+        </p:nvSpPr>
+        <p:spPr>
+          <a:xfrm>
+            <a:off x="693042" y="1779280"/>
+            <a:ext cx="8694539" cy="5377912"/>
+          </a:xfrm>
+        </p:spPr>
+        <p:txBody>
+          <a:bodyPr>
+            <a:noAutofit/>
+          </a:bodyPr>
+          <a:lstStyle/>
+          <a:p>
+            <a:pPr>
+              <a:lnSpc>
+                <a:spcPct val="150000"/>
+              </a:lnSpc>
+            </a:pPr>
+            <a:r>
+              <a:rPr lang="en-US" sz="2100" b="0" i="0" dirty="0">
+                <a:effectLst/>
+              </a:rPr>
+              <a:t>Chunking is a process of extracting </a:t>
+            </a:r>
+            <a:r>
+              <a:rPr lang="en-US" sz="2100" b="1" i="0" dirty="0">
+                <a:effectLst/>
+              </a:rPr>
+              <a:t>phrases</a:t>
+            </a:r>
+            <a:r>
+              <a:rPr lang="en-US" sz="2100" b="0" i="0" dirty="0">
+                <a:effectLst/>
+              </a:rPr>
+              <a:t> from unstructured text. </a:t>
+            </a:r>
+          </a:p>
+          <a:p>
+            <a:pPr>
+              <a:lnSpc>
+                <a:spcPct val="150000"/>
+              </a:lnSpc>
+            </a:pPr>
+            <a:r>
+              <a:rPr lang="en-US" sz="2100" b="0" i="0" dirty="0">
+                <a:effectLst/>
+              </a:rPr>
+              <a:t>Instead of using simple tokens which may not represent the actual meaning of the text, we can use phrases such as “</a:t>
+            </a:r>
+            <a:r>
+              <a:rPr lang="en-US" sz="2100" b="1" i="0" dirty="0">
+                <a:effectLst/>
+              </a:rPr>
+              <a:t>San Francisco</a:t>
+            </a:r>
+            <a:r>
+              <a:rPr lang="en-US" sz="2100" b="0" i="0" dirty="0">
+                <a:effectLst/>
+              </a:rPr>
+              <a:t>” as a single word instead of ‘</a:t>
+            </a:r>
+            <a:r>
+              <a:rPr lang="en-US" sz="2100" b="1" i="0" dirty="0">
+                <a:effectLst/>
+              </a:rPr>
+              <a:t>San</a:t>
+            </a:r>
+            <a:r>
+              <a:rPr lang="en-US" sz="2100" b="0" i="0" dirty="0">
+                <a:effectLst/>
+              </a:rPr>
+              <a:t>’ and ‘</a:t>
+            </a:r>
+            <a:r>
+              <a:rPr lang="en-US" sz="2100" b="1" i="0" dirty="0">
+                <a:effectLst/>
+              </a:rPr>
+              <a:t>Francisco</a:t>
+            </a:r>
+            <a:r>
+              <a:rPr lang="en-US" sz="2100" b="0" i="0" dirty="0">
+                <a:effectLst/>
+              </a:rPr>
+              <a:t>’ separate words.</a:t>
+            </a:r>
+          </a:p>
+          <a:p>
+            <a:pPr>
+              <a:lnSpc>
+                <a:spcPct val="150000"/>
+              </a:lnSpc>
+            </a:pPr>
+            <a:r>
+              <a:rPr lang="en-US" sz="2100" b="0" i="0" dirty="0">
+                <a:effectLst/>
+              </a:rPr>
+              <a:t>Works on top of POS tagging: uses POS tags as input and provides chunks as output like Noun and Verb Phrases.</a:t>
+            </a:r>
+          </a:p>
+          <a:p>
+            <a:pPr>
+              <a:lnSpc>
+                <a:spcPct val="150000"/>
+              </a:lnSpc>
+            </a:pPr>
+            <a:r>
+              <a:rPr lang="en-US" sz="2100" b="0" i="0" dirty="0">
+                <a:effectLst/>
+              </a:rPr>
+              <a:t>Very useful for extracting information from text for </a:t>
+            </a:r>
+            <a:r>
+              <a:rPr lang="en-US" sz="2100" b="1" i="0" dirty="0">
+                <a:effectLst/>
+              </a:rPr>
+              <a:t>Named Entity Extraction</a:t>
+            </a:r>
+            <a:r>
+              <a:rPr lang="en-US" sz="2100" b="0" i="0" dirty="0">
+                <a:effectLst/>
+              </a:rPr>
+              <a:t>.</a:t>
+            </a:r>
+          </a:p>
+        </p:txBody>
+      </p:sp>
+    </p:spTree>
+    <p:extLst>
+      <p:ext uri="{BB962C8B-B14F-4D97-AF65-F5344CB8AC3E}">
+        <p14:creationId xmlns:p14="http://schemas.microsoft.com/office/powerpoint/2010/main" val="3241848947"/>
       </p:ext>
     </p:extLst>
   </p:cSld>

</xml_diff>